<commit_message>
update lien git des tp
</commit_message>
<xml_diff>
--- a/documentations/1 - SOAP.pptx
+++ b/documentations/1 - SOAP.pptx
@@ -678,7 +678,7 @@
           <a:p>
             <a:fld id="{92C0ECB4-1DA6-4958-A0CF-A11808127F66}" type="datetimeFigureOut">
               <a:rPr lang="fr-FR" smtClean="0"/>
-              <a:t>17/11/2019</a:t>
+              <a:t>16/02/2021</a:t>
             </a:fld>
             <a:endParaRPr lang="fr-FR"/>
           </a:p>
@@ -843,7 +843,7 @@
           <a:p>
             <a:fld id="{79251E60-887E-4FF0-8411-14E4694F24DF}" type="datetimeFigureOut">
               <a:rPr lang="fr-FR" smtClean="0"/>
-              <a:t>17/11/2019</a:t>
+              <a:t>16/02/2021</a:t>
             </a:fld>
             <a:endParaRPr lang="fr-FR"/>
           </a:p>
@@ -2835,7 +2835,7 @@
           <a:p>
             <a:fld id="{3CD8DA6A-E332-4F44-A7D2-8F4CF34CC12E}" type="datetime1">
               <a:rPr lang="fr-FR" smtClean="0"/>
-              <a:t>17/11/2019</a:t>
+              <a:t>16/02/2021</a:t>
             </a:fld>
             <a:endParaRPr lang="fr-FR"/>
           </a:p>
@@ -3003,7 +3003,7 @@
           <a:p>
             <a:fld id="{65496462-926F-4E67-AAAE-B88F0984169C}" type="datetime1">
               <a:rPr lang="fr-FR" smtClean="0"/>
-              <a:t>17/11/2019</a:t>
+              <a:t>16/02/2021</a:t>
             </a:fld>
             <a:endParaRPr lang="fr-FR"/>
           </a:p>
@@ -3181,7 +3181,7 @@
           <a:p>
             <a:fld id="{4506E9E2-0E89-4306-8ECC-CBA3342BD3BE}" type="datetime1">
               <a:rPr lang="fr-FR" smtClean="0"/>
-              <a:t>17/11/2019</a:t>
+              <a:t>16/02/2021</a:t>
             </a:fld>
             <a:endParaRPr lang="fr-FR"/>
           </a:p>
@@ -3364,7 +3364,7 @@
           <a:p>
             <a:fld id="{E72244DD-159C-49DD-92F1-EBE9639D0EE0}" type="datetime1">
               <a:rPr lang="fr-FR" smtClean="0"/>
-              <a:t>17/11/2019</a:t>
+              <a:t>16/02/2021</a:t>
             </a:fld>
             <a:endParaRPr lang="fr-FR"/>
           </a:p>
@@ -3609,7 +3609,7 @@
           <a:p>
             <a:fld id="{5D3C99ED-186C-460B-B8FA-3099305AE68E}" type="datetime1">
               <a:rPr lang="fr-FR" smtClean="0"/>
-              <a:t>17/11/2019</a:t>
+              <a:t>16/02/2021</a:t>
             </a:fld>
             <a:endParaRPr lang="fr-FR"/>
           </a:p>
@@ -3838,7 +3838,7 @@
           <a:p>
             <a:fld id="{516E6981-5710-4BB6-84F1-DBCF841A5299}" type="datetime1">
               <a:rPr lang="fr-FR" smtClean="0"/>
-              <a:t>17/11/2019</a:t>
+              <a:t>16/02/2021</a:t>
             </a:fld>
             <a:endParaRPr lang="fr-FR"/>
           </a:p>
@@ -4202,7 +4202,7 @@
           <a:p>
             <a:fld id="{F16842B7-5BE0-42D3-A68E-4B9C958A16BA}" type="datetime1">
               <a:rPr lang="fr-FR" smtClean="0"/>
-              <a:t>17/11/2019</a:t>
+              <a:t>16/02/2021</a:t>
             </a:fld>
             <a:endParaRPr lang="fr-FR"/>
           </a:p>
@@ -4319,7 +4319,7 @@
           <a:p>
             <a:fld id="{4F651A2D-4434-45A5-975D-22BC481F14E4}" type="datetime1">
               <a:rPr lang="fr-FR" smtClean="0"/>
-              <a:t>17/11/2019</a:t>
+              <a:t>16/02/2021</a:t>
             </a:fld>
             <a:endParaRPr lang="fr-FR"/>
           </a:p>
@@ -4414,7 +4414,7 @@
           <a:p>
             <a:fld id="{388C0F5D-A627-4FC2-B3B9-0D7E690BC359}" type="datetime1">
               <a:rPr lang="fr-FR" smtClean="0"/>
-              <a:t>17/11/2019</a:t>
+              <a:t>16/02/2021</a:t>
             </a:fld>
             <a:endParaRPr lang="fr-FR"/>
           </a:p>
@@ -4689,7 +4689,7 @@
           <a:p>
             <a:fld id="{CCC28D6C-0D7C-4702-B4D9-18463E1D1007}" type="datetime1">
               <a:rPr lang="fr-FR" smtClean="0"/>
-              <a:t>17/11/2019</a:t>
+              <a:t>16/02/2021</a:t>
             </a:fld>
             <a:endParaRPr lang="fr-FR"/>
           </a:p>
@@ -4941,7 +4941,7 @@
           <a:p>
             <a:fld id="{E8BBF2F9-5F60-437C-BC45-B249DFB82E00}" type="datetime1">
               <a:rPr lang="fr-FR" smtClean="0"/>
-              <a:t>17/11/2019</a:t>
+              <a:t>16/02/2021</a:t>
             </a:fld>
             <a:endParaRPr lang="fr-FR"/>
           </a:p>
@@ -5152,7 +5152,7 @@
           <a:p>
             <a:fld id="{CCAF7043-D15A-4604-BA10-86076BDB4698}" type="datetime1">
               <a:rPr lang="fr-FR" smtClean="0"/>
-              <a:t>17/11/2019</a:t>
+              <a:t>16/02/2021</a:t>
             </a:fld>
             <a:endParaRPr lang="fr-FR"/>
           </a:p>
@@ -18365,10 +18365,9 @@
           <a:lstStyle/>
           <a:p>
             <a:r>
-              <a:rPr lang="fr-FR"/>
+              <a:rPr lang="fr-FR" dirty="0"/>
               <a:t>Guillaume Chervet </a:t>
             </a:r>
-            <a:endParaRPr lang="fr-FR" dirty="0"/>
           </a:p>
           <a:p>
             <a:pPr lvl="1"/>
@@ -18418,13 +18417,15 @@
             <a:endParaRPr lang="fr-FR" dirty="0"/>
           </a:p>
           <a:p>
-            <a:pPr lvl="1"/>
+            <a:pPr marL="457200" lvl="1" indent="0">
+              <a:buNone/>
+            </a:pPr>
             <a:endParaRPr lang="fr-FR" dirty="0"/>
           </a:p>
           <a:p>
             <a:r>
               <a:rPr lang="fr-FR" dirty="0"/>
-              <a:t>AXA Web center à Wasquehal plus de 170 développeurs</a:t>
+              <a:t>AXA Web center à Wasquehal plus de 200 développeurs</a:t>
             </a:r>
           </a:p>
           <a:p>
@@ -18528,7 +18529,7 @@
               <a:rPr lang="fr-FR" smtClean="0"/>
               <a:t>2</a:t>
             </a:fld>
-            <a:endParaRPr lang="fr-FR"/>
+            <a:endParaRPr lang="fr-FR" dirty="0"/>
           </a:p>
         </p:txBody>
       </p:sp>
@@ -22336,6 +22337,39 @@
               <a:rPr lang="fr-FR" sz="7200" dirty="0"/>
               <a:t>Votre présentation</a:t>
             </a:r>
+            <a:br>
+              <a:rPr lang="fr-FR" sz="7200" dirty="0"/>
+            </a:br>
+            <a:r>
+              <a:rPr lang="fr-FR" sz="1800" dirty="0"/>
+              <a:t>Qui êtes vous ?</a:t>
+            </a:r>
+            <a:br>
+              <a:rPr lang="fr-FR" sz="1800" dirty="0"/>
+            </a:br>
+            <a:r>
+              <a:rPr lang="fr-FR" sz="1800" dirty="0"/>
+              <a:t>Qu’est ce que vous voulez faire à la sortie ?</a:t>
+            </a:r>
+            <a:br>
+              <a:rPr lang="fr-FR" sz="1800" dirty="0"/>
+            </a:br>
+            <a:r>
+              <a:rPr lang="fr-FR" sz="1800" dirty="0"/>
+              <a:t>Background technique ?</a:t>
+            </a:r>
+            <a:br>
+              <a:rPr lang="fr-FR" sz="1800" dirty="0"/>
+            </a:br>
+            <a:r>
+              <a:rPr lang="fr-FR" sz="1800" dirty="0"/>
+              <a:t>Comment vous </a:t>
+            </a:r>
+            <a:r>
+              <a:rPr lang="fr-FR" sz="1800"/>
+              <a:t>vous sentez ?</a:t>
+            </a:r>
+            <a:endParaRPr lang="fr-FR" sz="1800" dirty="0"/>
           </a:p>
         </p:txBody>
       </p:sp>

</xml_diff>